<commit_message>
addressing comments from Matteo
</commit_message>
<xml_diff>
--- a/radical-media.v0.1.pptx
+++ b/radical-media.v0.1.pptx
@@ -8,6 +8,9 @@
   <p:notesMasterIdLst>
     <p:notesMasterId r:id="rId10"/>
   </p:notesMasterIdLst>
+  <p:handoutMasterIdLst>
+    <p:handoutMasterId r:id="rId11"/>
+  </p:handoutMasterIdLst>
   <p:sldIdLst>
     <p:sldId id="278" r:id="rId3"/>
     <p:sldId id="300" r:id="rId4"/>
@@ -117,6 +120,167 @@
 </p:presentation>
 </file>
 
+<file path=ppt/handoutMasters/handoutMaster1.xml><?xml version="1.0" encoding="utf-8"?>
+<p:handoutMaster xmlns:a="http://schemas.openxmlformats.org/drawingml/2006/main" xmlns:r="http://schemas.openxmlformats.org/officeDocument/2006/relationships" xmlns:mc="http://schemas.openxmlformats.org/markup-compatibility/2006" xmlns:mv="urn:schemas-microsoft-com:mac:vml" xmlns:p="http://schemas.openxmlformats.org/presentationml/2006/main" mc:Ignorable="mv" mc:PreserveAttributes="mv:*">
+  <p:cSld>
+    <p:bg>
+      <p:bgRef idx="1001">
+        <a:schemeClr val="bg1"/>
+      </p:bgRef>
+    </p:bg>
+    <p:spTree>
+      <p:nvGrpSpPr>
+        <p:cNvPr id="1" name=""/>
+        <p:cNvGrpSpPr/>
+        <p:nvPr/>
+      </p:nvGrpSpPr>
+      <p:grpSpPr>
+        <a:xfrm>
+          <a:off x="0" y="0"/>
+          <a:ext cx="0" cy="0"/>
+          <a:chOff x="0" y="0"/>
+          <a:chExt cx="0" cy="0"/>
+        </a:xfrm>
+      </p:grpSpPr>
+      <p:sp>
+        <p:nvSpPr>
+          <p:cNvPr id="2" name="Header Placeholder 1"/>
+          <p:cNvSpPr>
+            <a:spLocks noGrp="1"/>
+          </p:cNvSpPr>
+          <p:nvPr>
+            <p:ph type="hdr" sz="quarter"/>
+          </p:nvPr>
+        </p:nvSpPr>
+        <p:spPr>
+          <a:xfrm>
+            <a:off x="0" y="0"/>
+            <a:ext cx="2971800" cy="457200"/>
+          </a:xfrm>
+          <a:prstGeom prst="rect">
+            <a:avLst/>
+          </a:prstGeom>
+        </p:spPr>
+        <p:txBody>
+          <a:bodyPr vert="horz" lIns="91440" tIns="45720" rIns="91440" bIns="45720" rtlCol="0"/>
+          <a:lstStyle>
+            <a:lvl1pPr algn="l">
+              <a:defRPr sz="1200"/>
+            </a:lvl1pPr>
+          </a:lstStyle>
+          <a:p>
+            <a:endParaRPr lang="en-US"/>
+          </a:p>
+        </p:txBody>
+      </p:sp>
+      <p:sp>
+        <p:nvSpPr>
+          <p:cNvPr id="3" name="Date Placeholder 2"/>
+          <p:cNvSpPr>
+            <a:spLocks noGrp="1"/>
+          </p:cNvSpPr>
+          <p:nvPr>
+            <p:ph type="dt" sz="quarter" idx="1"/>
+          </p:nvPr>
+        </p:nvSpPr>
+        <p:spPr>
+          <a:xfrm>
+            <a:off x="3884613" y="0"/>
+            <a:ext cx="2971800" cy="457200"/>
+          </a:xfrm>
+          <a:prstGeom prst="rect">
+            <a:avLst/>
+          </a:prstGeom>
+        </p:spPr>
+        <p:txBody>
+          <a:bodyPr vert="horz" lIns="91440" tIns="45720" rIns="91440" bIns="45720" rtlCol="0"/>
+          <a:lstStyle>
+            <a:lvl1pPr algn="r">
+              <a:defRPr sz="1200"/>
+            </a:lvl1pPr>
+          </a:lstStyle>
+          <a:p>
+            <a:fld id="{E1E2ABA7-5A4F-AD48-B84D-E198E6AF306C}" type="datetimeFigureOut">
+              <a:rPr lang="en-US" smtClean="0"/>
+              <a:t>4/22/13</a:t>
+            </a:fld>
+            <a:endParaRPr lang="en-US"/>
+          </a:p>
+        </p:txBody>
+      </p:sp>
+      <p:sp>
+        <p:nvSpPr>
+          <p:cNvPr id="4" name="Footer Placeholder 3"/>
+          <p:cNvSpPr>
+            <a:spLocks noGrp="1"/>
+          </p:cNvSpPr>
+          <p:nvPr>
+            <p:ph type="ftr" sz="quarter" idx="2"/>
+          </p:nvPr>
+        </p:nvSpPr>
+        <p:spPr>
+          <a:xfrm>
+            <a:off x="0" y="8685213"/>
+            <a:ext cx="2971800" cy="457200"/>
+          </a:xfrm>
+          <a:prstGeom prst="rect">
+            <a:avLst/>
+          </a:prstGeom>
+        </p:spPr>
+        <p:txBody>
+          <a:bodyPr vert="horz" lIns="91440" tIns="45720" rIns="91440" bIns="45720" rtlCol="0" anchor="b"/>
+          <a:lstStyle>
+            <a:lvl1pPr algn="l">
+              <a:defRPr sz="1200"/>
+            </a:lvl1pPr>
+          </a:lstStyle>
+          <a:p>
+            <a:endParaRPr lang="en-US"/>
+          </a:p>
+        </p:txBody>
+      </p:sp>
+      <p:sp>
+        <p:nvSpPr>
+          <p:cNvPr id="5" name="Slide Number Placeholder 4"/>
+          <p:cNvSpPr>
+            <a:spLocks noGrp="1"/>
+          </p:cNvSpPr>
+          <p:nvPr>
+            <p:ph type="sldNum" sz="quarter" idx="3"/>
+          </p:nvPr>
+        </p:nvSpPr>
+        <p:spPr>
+          <a:xfrm>
+            <a:off x="3884613" y="8685213"/>
+            <a:ext cx="2971800" cy="457200"/>
+          </a:xfrm>
+          <a:prstGeom prst="rect">
+            <a:avLst/>
+          </a:prstGeom>
+        </p:spPr>
+        <p:txBody>
+          <a:bodyPr vert="horz" lIns="91440" tIns="45720" rIns="91440" bIns="45720" rtlCol="0" anchor="b"/>
+          <a:lstStyle>
+            <a:lvl1pPr algn="r">
+              <a:defRPr sz="1200"/>
+            </a:lvl1pPr>
+          </a:lstStyle>
+          <a:p>
+            <a:fld id="{63E891C9-1D4F-0F42-9267-8EBC1CD3D1E3}" type="slidenum">
+              <a:rPr lang="en-US" smtClean="0"/>
+              <a:t>‹#›</a:t>
+            </a:fld>
+            <a:endParaRPr lang="en-US"/>
+          </a:p>
+        </p:txBody>
+      </p:sp>
+    </p:spTree>
+  </p:cSld>
+  <p:clrMap bg1="lt1" tx1="dk1" bg2="lt2" tx2="dk2" accent1="accent1" accent2="accent2" accent3="accent3" accent4="accent4" accent5="accent5" accent6="accent6" hlink="hlink" folHlink="folHlink"/>
+  <p:hf hdr="0" ftr="0" dt="0"/>
+</p:handoutMaster>
+</file>
+
 <file path=ppt/notesMasters/notesMaster1.xml><?xml version="1.0" encoding="utf-8"?>
 <p:notesMaster xmlns:a="http://schemas.openxmlformats.org/drawingml/2006/main" xmlns:r="http://schemas.openxmlformats.org/officeDocument/2006/relationships" xmlns:mc="http://schemas.openxmlformats.org/markup-compatibility/2006" xmlns:mv="urn:schemas-microsoft-com:mac:vml" xmlns:p="http://schemas.openxmlformats.org/presentationml/2006/main" mc:Ignorable="mv" mc:PreserveAttributes="mv:*">
   <p:cSld>
@@ -374,6 +538,7 @@
     </p:extLst>
   </p:cSld>
   <p:clrMap bg1="lt1" tx1="dk1" bg2="lt2" tx2="dk2" accent1="accent1" accent2="accent2" accent3="accent3" accent4="accent4" accent5="accent5" accent6="accent6" hlink="hlink" folHlink="folHlink"/>
+  <p:hf hdr="0" ftr="0" dt="0"/>
   <p:notesStyle>
     <a:lvl1pPr marL="0" algn="l" defTabSz="914400" rtl="0" eaLnBrk="1" latinLnBrk="0" hangingPunct="1">
       <a:defRPr sz="1200" kern="1200">
@@ -1311,6 +1476,7 @@
     <p:sldLayoutId id="2147483901" r:id="rId1"/>
     <p:sldLayoutId id="2147483902" r:id="rId2"/>
   </p:sldLayoutIdLst>
+  <p:hf hdr="0" ftr="0" dt="0"/>
   <p:txStyles>
     <p:titleStyle>
       <a:lvl1pPr algn="l" rtl="0" eaLnBrk="0" fontAlgn="base" hangingPunct="0">
@@ -1928,6 +2094,7 @@
   <p:sldLayoutIdLst>
     <p:sldLayoutId id="2147483906" r:id="rId1"/>
   </p:sldLayoutIdLst>
+  <p:hf hdr="0" ftr="0" dt="0"/>
   <p:txStyles>
     <p:titleStyle>
       <a:lvl1pPr algn="l" rtl="0" eaLnBrk="0" fontAlgn="base" hangingPunct="0">
@@ -2791,7 +2958,7 @@
         <p:spPr>
           <a:xfrm>
             <a:off x="304800" y="1524000"/>
-            <a:ext cx="8382000" cy="5105400"/>
+            <a:ext cx="8382000" cy="4800600"/>
           </a:xfrm>
         </p:spPr>
         <p:txBody>
@@ -2806,7 +2973,7 @@
             <a:r>
               <a:rPr lang="en-US" sz="1800" dirty="0" smtClean="0">
                 <a:solidFill>
-                  <a:srgbClr val="D7112E"/>
+                  <a:srgbClr val="800000"/>
                 </a:solidFill>
               </a:rPr>
               <a:t>The Problem</a:t>
@@ -2857,7 +3024,15 @@
             <a:pPr lvl="2"/>
             <a:r>
               <a:rPr lang="en-US" sz="1800" dirty="0" smtClean="0"/>
-              <a:t>Innovation in Middleware has not kept pace with DCI </a:t>
+              <a:t>Innovation in </a:t>
+            </a:r>
+            <a:r>
+              <a:rPr lang="en-US" sz="1800" dirty="0" smtClean="0"/>
+              <a:t>Middleware </a:t>
+            </a:r>
+            <a:r>
+              <a:rPr lang="en-US" sz="1800" dirty="0" smtClean="0"/>
+              <a:t>has not kept pace with DCI </a:t>
             </a:r>
           </a:p>
           <a:p>
@@ -2877,7 +3052,7 @@
             <a:r>
               <a:rPr lang="en-US" sz="1800" dirty="0" smtClean="0">
                 <a:solidFill>
-                  <a:srgbClr val="D7112E"/>
+                  <a:srgbClr val="800000"/>
                 </a:solidFill>
               </a:rPr>
               <a:t>The Hypothesis</a:t>
@@ -2919,7 +3094,7 @@
             <a:r>
               <a:rPr lang="en-US" sz="1800" dirty="0" smtClean="0">
                 <a:solidFill>
-                  <a:srgbClr val="D7112E"/>
+                  <a:srgbClr val="800000"/>
                 </a:solidFill>
               </a:rPr>
               <a:t>The Solution</a:t>
@@ -2949,6 +3124,35 @@
           </a:p>
           <a:p>
             <a:endParaRPr lang="en-US" sz="1800" dirty="0"/>
+          </a:p>
+        </p:txBody>
+      </p:sp>
+      <p:sp>
+        <p:nvSpPr>
+          <p:cNvPr id="6" name="Slide Number Placeholder 5"/>
+          <p:cNvSpPr>
+            <a:spLocks noGrp="1"/>
+          </p:cNvSpPr>
+          <p:nvPr>
+            <p:ph type="sldNum" sz="quarter" idx="10"/>
+          </p:nvPr>
+        </p:nvSpPr>
+        <p:spPr/>
+        <p:txBody>
+          <a:bodyPr/>
+          <a:lstStyle/>
+          <a:p>
+            <a:pPr>
+              <a:defRPr/>
+            </a:pPr>
+            <a:fld id="{9DC934F5-78BB-C446-884A-1B08496610C1}" type="slidenum">
+              <a:rPr lang="en-US" smtClean="0"/>
+              <a:pPr>
+                <a:defRPr/>
+              </a:pPr>
+              <a:t>2</a:t>
+            </a:fld>
+            <a:endParaRPr lang="en-US"/>
           </a:p>
         </p:txBody>
       </p:sp>
@@ -3095,6 +3299,35 @@
           </a:p>
         </p:txBody>
       </p:sp>
+      <p:sp>
+        <p:nvSpPr>
+          <p:cNvPr id="4" name="Slide Number Placeholder 3"/>
+          <p:cNvSpPr>
+            <a:spLocks noGrp="1"/>
+          </p:cNvSpPr>
+          <p:nvPr>
+            <p:ph type="sldNum" sz="quarter" idx="10"/>
+          </p:nvPr>
+        </p:nvSpPr>
+        <p:spPr/>
+        <p:txBody>
+          <a:bodyPr/>
+          <a:lstStyle/>
+          <a:p>
+            <a:pPr>
+              <a:defRPr/>
+            </a:pPr>
+            <a:fld id="{93C2727F-6638-0745-BE71-CCA216F13CA7}" type="slidenum">
+              <a:rPr lang="en-US" smtClean="0"/>
+              <a:pPr>
+                <a:defRPr/>
+              </a:pPr>
+              <a:t>3</a:t>
+            </a:fld>
+            <a:endParaRPr lang="en-US"/>
+          </a:p>
+        </p:txBody>
+      </p:sp>
     </p:spTree>
   </p:cSld>
   <p:clrMapOvr>
@@ -3129,32 +3362,6 @@
       </p:grpSpPr>
       <p:sp>
         <p:nvSpPr>
-          <p:cNvPr id="9218" name="Slide Number Placeholder 3"/>
-          <p:cNvSpPr>
-            <a:spLocks noGrp="1"/>
-          </p:cNvSpPr>
-          <p:nvPr>
-            <p:ph type="sldNum" sz="quarter" idx="10"/>
-          </p:nvPr>
-        </p:nvSpPr>
-        <p:spPr>
-          <a:noFill/>
-        </p:spPr>
-        <p:txBody>
-          <a:bodyPr/>
-          <a:lstStyle/>
-          <a:p>
-            <a:fld id="{28661D8E-E811-BF44-97CE-52E247299B45}" type="slidenum">
-              <a:rPr lang="en-US"/>
-              <a:pPr/>
-              <a:t>4</a:t>
-            </a:fld>
-            <a:endParaRPr lang="en-US"/>
-          </a:p>
-        </p:txBody>
-      </p:sp>
-      <p:sp>
-        <p:nvSpPr>
           <p:cNvPr id="9219" name="Rectangle 2"/>
           <p:cNvSpPr>
             <a:spLocks noGrp="1" noChangeArrowheads="1"/>
@@ -3198,7 +3405,11 @@
           <a:lstStyle/>
           <a:p>
             <a:r>
-              <a:rPr lang="en-US" sz="2000" dirty="0" smtClean="0"/>
+              <a:rPr lang="en-US" sz="2000" dirty="0" smtClean="0">
+                <a:solidFill>
+                  <a:srgbClr val="800000"/>
+                </a:solidFill>
+              </a:rPr>
               <a:t>What?</a:t>
             </a:r>
           </a:p>
@@ -3230,7 +3441,11 @@
           </a:p>
           <a:p>
             <a:r>
-              <a:rPr lang="en-US" sz="2000" dirty="0" smtClean="0"/>
+              <a:rPr lang="en-US" sz="2000" dirty="0" smtClean="0">
+                <a:solidFill>
+                  <a:srgbClr val="800000"/>
+                </a:solidFill>
+              </a:rPr>
               <a:t>How is SAGA Used?</a:t>
             </a:r>
           </a:p>
@@ -3269,16 +3484,36 @@
               <a:buChar char="•"/>
             </a:pPr>
             <a:r>
+              <a:rPr lang="en-US" sz="2000" dirty="0" smtClean="0">
+                <a:solidFill>
+                  <a:srgbClr val="800000"/>
+                </a:solidFill>
+              </a:rPr>
+              <a:t>Benefits?</a:t>
+            </a:r>
+          </a:p>
+          <a:p>
+            <a:pPr marL="742950" lvl="2" indent="-342900"/>
+            <a:r>
               <a:rPr lang="en-US" sz="2000" dirty="0" smtClean="0"/>
-              <a:t>Benefits?</a:t>
+              <a:t>Standards facilitate interoperability and extensibility, and thus permit innovation at higher and other </a:t>
+            </a:r>
+            <a:r>
+              <a:rPr lang="en-US" sz="2000" dirty="0" smtClean="0"/>
+              <a:t>levels</a:t>
             </a:r>
           </a:p>
           <a:p>
             <a:pPr marL="742950" lvl="2" indent="-342900"/>
             <a:r>
               <a:rPr lang="en-US" sz="2000" dirty="0" smtClean="0"/>
-              <a:t>Standards facilitate interoperability and extensibility, and thus permit innovation at higher and other levels </a:t>
-            </a:r>
+              <a:t>Multiple implementations and adaptors available</a:t>
+            </a:r>
+            <a:r>
+              <a:rPr lang="en-US" sz="2000" dirty="0" smtClean="0"/>
+              <a:t> </a:t>
+            </a:r>
+            <a:endParaRPr lang="en-US" sz="2000" dirty="0" smtClean="0"/>
           </a:p>
           <a:p>
             <a:pPr>
@@ -3286,6 +3521,35 @@
               <a:buNone/>
             </a:pPr>
             <a:endParaRPr lang="en-US" sz="2000" dirty="0" smtClean="0"/>
+          </a:p>
+        </p:txBody>
+      </p:sp>
+      <p:sp>
+        <p:nvSpPr>
+          <p:cNvPr id="5" name="Slide Number Placeholder 4"/>
+          <p:cNvSpPr>
+            <a:spLocks noGrp="1"/>
+          </p:cNvSpPr>
+          <p:nvPr>
+            <p:ph type="sldNum" sz="quarter" idx="10"/>
+          </p:nvPr>
+        </p:nvSpPr>
+        <p:spPr/>
+        <p:txBody>
+          <a:bodyPr/>
+          <a:lstStyle/>
+          <a:p>
+            <a:pPr>
+              <a:defRPr/>
+            </a:pPr>
+            <a:fld id="{9DC934F5-78BB-C446-884A-1B08496610C1}" type="slidenum">
+              <a:rPr lang="en-US" smtClean="0"/>
+              <a:pPr>
+                <a:defRPr/>
+              </a:pPr>
+              <a:t>4</a:t>
+            </a:fld>
+            <a:endParaRPr lang="en-US"/>
           </a:p>
         </p:txBody>
       </p:sp>
@@ -3340,32 +3604,6 @@
               <a:rPr lang="en-US" smtClean="0"/>
               <a:t>Background</a:t>
             </a:r>
-          </a:p>
-        </p:txBody>
-      </p:sp>
-      <p:sp>
-        <p:nvSpPr>
-          <p:cNvPr id="11267" name="Slide Number Placeholder 3"/>
-          <p:cNvSpPr>
-            <a:spLocks noGrp="1"/>
-          </p:cNvSpPr>
-          <p:nvPr>
-            <p:ph type="sldNum" sz="quarter" idx="10"/>
-          </p:nvPr>
-        </p:nvSpPr>
-        <p:spPr>
-          <a:noFill/>
-        </p:spPr>
-        <p:txBody>
-          <a:bodyPr/>
-          <a:lstStyle/>
-          <a:p>
-            <a:fld id="{87D23168-F2DD-A34E-B045-B7F309F25D64}" type="slidenum">
-              <a:rPr lang="en-US" smtClean="0"/>
-              <a:pPr/>
-              <a:t>5</a:t>
-            </a:fld>
-            <a:endParaRPr lang="en-US" smtClean="0"/>
           </a:p>
         </p:txBody>
       </p:sp>
@@ -3441,6 +3679,35 @@
           </a:p>
         </p:txBody>
       </p:sp>
+      <p:sp>
+        <p:nvSpPr>
+          <p:cNvPr id="6" name="Slide Number Placeholder 5"/>
+          <p:cNvSpPr>
+            <a:spLocks noGrp="1"/>
+          </p:cNvSpPr>
+          <p:nvPr>
+            <p:ph type="sldNum" sz="quarter" idx="10"/>
+          </p:nvPr>
+        </p:nvSpPr>
+        <p:spPr/>
+        <p:txBody>
+          <a:bodyPr/>
+          <a:lstStyle/>
+          <a:p>
+            <a:pPr>
+              <a:defRPr/>
+            </a:pPr>
+            <a:fld id="{9DC934F5-78BB-C446-884A-1B08496610C1}" type="slidenum">
+              <a:rPr lang="en-US" smtClean="0"/>
+              <a:pPr>
+                <a:defRPr/>
+              </a:pPr>
+              <a:t>5</a:t>
+            </a:fld>
+            <a:endParaRPr lang="en-US"/>
+          </a:p>
+        </p:txBody>
+      </p:sp>
     </p:spTree>
   </p:cSld>
   <p:clrMapOvr>
@@ -3641,8 +3908,8 @@
         </p:blipFill>
         <p:spPr bwMode="auto">
           <a:xfrm>
-            <a:off x="6673850" y="4775200"/>
-            <a:ext cx="2165350" cy="1836738"/>
+            <a:off x="6172200" y="4876800"/>
+            <a:ext cx="1626352" cy="1379538"/>
           </a:xfrm>
           <a:prstGeom prst="rect">
             <a:avLst/>
@@ -3656,6 +3923,40 @@
           </a:ln>
         </p:spPr>
       </p:pic>
+      <p:sp>
+        <p:nvSpPr>
+          <p:cNvPr id="5" name="Slide Number Placeholder 4"/>
+          <p:cNvSpPr>
+            <a:spLocks noGrp="1"/>
+          </p:cNvSpPr>
+          <p:nvPr>
+            <p:ph type="sldNum" sz="quarter" idx="10"/>
+          </p:nvPr>
+        </p:nvSpPr>
+        <p:spPr>
+          <a:xfrm>
+            <a:off x="6705600" y="6248400"/>
+            <a:ext cx="2133600" cy="476250"/>
+          </a:xfrm>
+        </p:spPr>
+        <p:txBody>
+          <a:bodyPr/>
+          <a:lstStyle/>
+          <a:p>
+            <a:pPr>
+              <a:defRPr/>
+            </a:pPr>
+            <a:fld id="{9DC934F5-78BB-C446-884A-1B08496610C1}" type="slidenum">
+              <a:rPr lang="en-US" smtClean="0"/>
+              <a:pPr>
+                <a:defRPr/>
+              </a:pPr>
+              <a:t>6</a:t>
+            </a:fld>
+            <a:endParaRPr lang="en-US" dirty="0"/>
+          </a:p>
+        </p:txBody>
+      </p:sp>
     </p:spTree>
   </p:cSld>
   <p:clrMapOvr>
@@ -3839,6 +4140,35 @@
               <a:t>?</a:t>
             </a:r>
             <a:endParaRPr lang="en-US" sz="2000" dirty="0"/>
+          </a:p>
+        </p:txBody>
+      </p:sp>
+      <p:sp>
+        <p:nvSpPr>
+          <p:cNvPr id="4" name="Slide Number Placeholder 3"/>
+          <p:cNvSpPr>
+            <a:spLocks noGrp="1"/>
+          </p:cNvSpPr>
+          <p:nvPr>
+            <p:ph type="sldNum" sz="quarter" idx="10"/>
+          </p:nvPr>
+        </p:nvSpPr>
+        <p:spPr/>
+        <p:txBody>
+          <a:bodyPr/>
+          <a:lstStyle/>
+          <a:p>
+            <a:pPr>
+              <a:defRPr/>
+            </a:pPr>
+            <a:fld id="{9DC934F5-78BB-C446-884A-1B08496610C1}" type="slidenum">
+              <a:rPr lang="en-US" smtClean="0"/>
+              <a:pPr>
+                <a:defRPr/>
+              </a:pPr>
+              <a:t>7</a:t>
+            </a:fld>
+            <a:endParaRPr lang="en-US"/>
           </a:p>
         </p:txBody>
       </p:sp>
@@ -5639,4 +5969,322 @@
   <a:objectDefaults/>
   <a:extraClrSchemeLst/>
 </a:theme>
+</file>
+
+<file path=ppt/theme/theme4.xml><?xml version="1.0" encoding="utf-8"?>
+<a:theme xmlns:a="http://schemas.openxmlformats.org/drawingml/2006/main" name="Office Theme">
+  <a:themeElements>
+    <a:clrScheme name="Office">
+      <a:dk1>
+        <a:sysClr val="windowText" lastClr="000000"/>
+      </a:dk1>
+      <a:lt1>
+        <a:sysClr val="window" lastClr="FFFFFF"/>
+      </a:lt1>
+      <a:dk2>
+        <a:srgbClr val="1F497D"/>
+      </a:dk2>
+      <a:lt2>
+        <a:srgbClr val="EEECE1"/>
+      </a:lt2>
+      <a:accent1>
+        <a:srgbClr val="4F81BD"/>
+      </a:accent1>
+      <a:accent2>
+        <a:srgbClr val="C0504D"/>
+      </a:accent2>
+      <a:accent3>
+        <a:srgbClr val="9BBB59"/>
+      </a:accent3>
+      <a:accent4>
+        <a:srgbClr val="8064A2"/>
+      </a:accent4>
+      <a:accent5>
+        <a:srgbClr val="4BACC6"/>
+      </a:accent5>
+      <a:accent6>
+        <a:srgbClr val="F79646"/>
+      </a:accent6>
+      <a:hlink>
+        <a:srgbClr val="0000FF"/>
+      </a:hlink>
+      <a:folHlink>
+        <a:srgbClr val="800080"/>
+      </a:folHlink>
+    </a:clrScheme>
+    <a:fontScheme name="Office">
+      <a:majorFont>
+        <a:latin typeface="Calibri"/>
+        <a:ea typeface=""/>
+        <a:cs typeface=""/>
+        <a:font script="Jpan" typeface="ＭＳ Ｐゴシック"/>
+        <a:font script="Hang" typeface="맑은 고딕"/>
+        <a:font script="Hans" typeface="宋体"/>
+        <a:font script="Hant" typeface="新細明體"/>
+        <a:font script="Arab" typeface="Times New Roman"/>
+        <a:font script="Hebr" typeface="Times New Roman"/>
+        <a:font script="Thai" typeface="Angsana New"/>
+        <a:font script="Ethi" typeface="Nyala"/>
+        <a:font script="Beng" typeface="Vrinda"/>
+        <a:font script="Gujr" typeface="Shruti"/>
+        <a:font script="Khmr" typeface="MoolBoran"/>
+        <a:font script="Knda" typeface="Tunga"/>
+        <a:font script="Guru" typeface="Raavi"/>
+        <a:font script="Cans" typeface="Euphemia"/>
+        <a:font script="Cher" typeface="Plantagenet Cherokee"/>
+        <a:font script="Yiii" typeface="Microsoft Yi Baiti"/>
+        <a:font script="Tibt" typeface="Microsoft Himalaya"/>
+        <a:font script="Thaa" typeface="MV Boli"/>
+        <a:font script="Deva" typeface="Mangal"/>
+        <a:font script="Telu" typeface="Gautami"/>
+        <a:font script="Taml" typeface="Latha"/>
+        <a:font script="Syrc" typeface="Estrangelo Edessa"/>
+        <a:font script="Orya" typeface="Kalinga"/>
+        <a:font script="Mlym" typeface="Kartika"/>
+        <a:font script="Laoo" typeface="DokChampa"/>
+        <a:font script="Sinh" typeface="Iskoola Pota"/>
+        <a:font script="Mong" typeface="Mongolian Baiti"/>
+        <a:font script="Viet" typeface="Times New Roman"/>
+        <a:font script="Uigh" typeface="Microsoft Uighur"/>
+      </a:majorFont>
+      <a:minorFont>
+        <a:latin typeface="Calibri"/>
+        <a:ea typeface=""/>
+        <a:cs typeface=""/>
+        <a:font script="Jpan" typeface="ＭＳ Ｐゴシック"/>
+        <a:font script="Hang" typeface="맑은 고딕"/>
+        <a:font script="Hans" typeface="宋体"/>
+        <a:font script="Hant" typeface="新細明體"/>
+        <a:font script="Arab" typeface="Arial"/>
+        <a:font script="Hebr" typeface="Arial"/>
+        <a:font script="Thai" typeface="Cordia New"/>
+        <a:font script="Ethi" typeface="Nyala"/>
+        <a:font script="Beng" typeface="Vrinda"/>
+        <a:font script="Gujr" typeface="Shruti"/>
+        <a:font script="Khmr" typeface="DaunPenh"/>
+        <a:font script="Knda" typeface="Tunga"/>
+        <a:font script="Guru" typeface="Raavi"/>
+        <a:font script="Cans" typeface="Euphemia"/>
+        <a:font script="Cher" typeface="Plantagenet Cherokee"/>
+        <a:font script="Yiii" typeface="Microsoft Yi Baiti"/>
+        <a:font script="Tibt" typeface="Microsoft Himalaya"/>
+        <a:font script="Thaa" typeface="MV Boli"/>
+        <a:font script="Deva" typeface="Mangal"/>
+        <a:font script="Telu" typeface="Gautami"/>
+        <a:font script="Taml" typeface="Latha"/>
+        <a:font script="Syrc" typeface="Estrangelo Edessa"/>
+        <a:font script="Orya" typeface="Kalinga"/>
+        <a:font script="Mlym" typeface="Kartika"/>
+        <a:font script="Laoo" typeface="DokChampa"/>
+        <a:font script="Sinh" typeface="Iskoola Pota"/>
+        <a:font script="Mong" typeface="Mongolian Baiti"/>
+        <a:font script="Viet" typeface="Arial"/>
+        <a:font script="Uigh" typeface="Microsoft Uighur"/>
+      </a:minorFont>
+    </a:fontScheme>
+    <a:fmtScheme name="Office">
+      <a:fillStyleLst>
+        <a:solidFill>
+          <a:schemeClr val="phClr"/>
+        </a:solidFill>
+        <a:gradFill rotWithShape="1">
+          <a:gsLst>
+            <a:gs pos="0">
+              <a:schemeClr val="phClr">
+                <a:tint val="50000"/>
+                <a:satMod val="300000"/>
+              </a:schemeClr>
+            </a:gs>
+            <a:gs pos="35000">
+              <a:schemeClr val="phClr">
+                <a:tint val="37000"/>
+                <a:satMod val="300000"/>
+              </a:schemeClr>
+            </a:gs>
+            <a:gs pos="100000">
+              <a:schemeClr val="phClr">
+                <a:tint val="15000"/>
+                <a:satMod val="350000"/>
+              </a:schemeClr>
+            </a:gs>
+          </a:gsLst>
+          <a:lin ang="16200000" scaled="1"/>
+        </a:gradFill>
+        <a:gradFill rotWithShape="1">
+          <a:gsLst>
+            <a:gs pos="0">
+              <a:schemeClr val="phClr">
+                <a:tint val="100000"/>
+                <a:shade val="100000"/>
+                <a:satMod val="130000"/>
+              </a:schemeClr>
+            </a:gs>
+            <a:gs pos="100000">
+              <a:schemeClr val="phClr">
+                <a:tint val="50000"/>
+                <a:shade val="100000"/>
+                <a:satMod val="350000"/>
+              </a:schemeClr>
+            </a:gs>
+          </a:gsLst>
+          <a:lin ang="16200000" scaled="0"/>
+        </a:gradFill>
+      </a:fillStyleLst>
+      <a:lnStyleLst>
+        <a:ln w="9525" cap="flat" cmpd="sng" algn="ctr">
+          <a:solidFill>
+            <a:schemeClr val="phClr">
+              <a:shade val="95000"/>
+              <a:satMod val="105000"/>
+            </a:schemeClr>
+          </a:solidFill>
+          <a:prstDash val="solid"/>
+        </a:ln>
+        <a:ln w="25400" cap="flat" cmpd="sng" algn="ctr">
+          <a:solidFill>
+            <a:schemeClr val="phClr"/>
+          </a:solidFill>
+          <a:prstDash val="solid"/>
+        </a:ln>
+        <a:ln w="38100" cap="flat" cmpd="sng" algn="ctr">
+          <a:solidFill>
+            <a:schemeClr val="phClr"/>
+          </a:solidFill>
+          <a:prstDash val="solid"/>
+        </a:ln>
+      </a:lnStyleLst>
+      <a:effectStyleLst>
+        <a:effectStyle>
+          <a:effectLst>
+            <a:outerShdw blurRad="40000" dist="20000" dir="5400000" rotWithShape="0">
+              <a:srgbClr val="000000">
+                <a:alpha val="38000"/>
+              </a:srgbClr>
+            </a:outerShdw>
+          </a:effectLst>
+        </a:effectStyle>
+        <a:effectStyle>
+          <a:effectLst>
+            <a:outerShdw blurRad="40000" dist="23000" dir="5400000" rotWithShape="0">
+              <a:srgbClr val="000000">
+                <a:alpha val="35000"/>
+              </a:srgbClr>
+            </a:outerShdw>
+          </a:effectLst>
+        </a:effectStyle>
+        <a:effectStyle>
+          <a:effectLst>
+            <a:outerShdw blurRad="40000" dist="23000" dir="5400000" rotWithShape="0">
+              <a:srgbClr val="000000">
+                <a:alpha val="35000"/>
+              </a:srgbClr>
+            </a:outerShdw>
+          </a:effectLst>
+          <a:scene3d>
+            <a:camera prst="orthographicFront">
+              <a:rot lat="0" lon="0" rev="0"/>
+            </a:camera>
+            <a:lightRig rig="threePt" dir="t">
+              <a:rot lat="0" lon="0" rev="1200000"/>
+            </a:lightRig>
+          </a:scene3d>
+          <a:sp3d>
+            <a:bevelT w="63500" h="25400"/>
+          </a:sp3d>
+        </a:effectStyle>
+      </a:effectStyleLst>
+      <a:bgFillStyleLst>
+        <a:solidFill>
+          <a:schemeClr val="phClr"/>
+        </a:solidFill>
+        <a:gradFill rotWithShape="1">
+          <a:gsLst>
+            <a:gs pos="0">
+              <a:schemeClr val="phClr">
+                <a:tint val="40000"/>
+                <a:satMod val="350000"/>
+              </a:schemeClr>
+            </a:gs>
+            <a:gs pos="40000">
+              <a:schemeClr val="phClr">
+                <a:tint val="45000"/>
+                <a:shade val="99000"/>
+                <a:satMod val="350000"/>
+              </a:schemeClr>
+            </a:gs>
+            <a:gs pos="100000">
+              <a:schemeClr val="phClr">
+                <a:shade val="20000"/>
+                <a:satMod val="255000"/>
+              </a:schemeClr>
+            </a:gs>
+          </a:gsLst>
+          <a:path path="circle">
+            <a:fillToRect l="50000" t="-80000" r="50000" b="180000"/>
+          </a:path>
+        </a:gradFill>
+        <a:gradFill rotWithShape="1">
+          <a:gsLst>
+            <a:gs pos="0">
+              <a:schemeClr val="phClr">
+                <a:tint val="80000"/>
+                <a:satMod val="300000"/>
+              </a:schemeClr>
+            </a:gs>
+            <a:gs pos="100000">
+              <a:schemeClr val="phClr">
+                <a:shade val="30000"/>
+                <a:satMod val="200000"/>
+              </a:schemeClr>
+            </a:gs>
+          </a:gsLst>
+          <a:path path="circle">
+            <a:fillToRect l="50000" t="50000" r="50000" b="50000"/>
+          </a:path>
+        </a:gradFill>
+      </a:bgFillStyleLst>
+    </a:fmtScheme>
+  </a:themeElements>
+  <a:objectDefaults>
+    <a:spDef>
+      <a:spPr/>
+      <a:bodyPr/>
+      <a:lstStyle/>
+      <a:style>
+        <a:lnRef idx="1">
+          <a:schemeClr val="accent1"/>
+        </a:lnRef>
+        <a:fillRef idx="3">
+          <a:schemeClr val="accent1"/>
+        </a:fillRef>
+        <a:effectRef idx="2">
+          <a:schemeClr val="accent1"/>
+        </a:effectRef>
+        <a:fontRef idx="minor">
+          <a:schemeClr val="lt1"/>
+        </a:fontRef>
+      </a:style>
+    </a:spDef>
+    <a:lnDef>
+      <a:spPr/>
+      <a:bodyPr/>
+      <a:lstStyle/>
+      <a:style>
+        <a:lnRef idx="2">
+          <a:schemeClr val="accent1"/>
+        </a:lnRef>
+        <a:fillRef idx="0">
+          <a:schemeClr val="accent1"/>
+        </a:fillRef>
+        <a:effectRef idx="1">
+          <a:schemeClr val="accent1"/>
+        </a:effectRef>
+        <a:fontRef idx="minor">
+          <a:schemeClr val="tx1"/>
+        </a:fontRef>
+      </a:style>
+    </a:lnDef>
+  </a:objectDefaults>
+  <a:extraClrSchemeLst/>
+</a:theme>
 </file>
</xml_diff>